<commit_message>
#1109 Class 설계서 작성
요구사항 추가 요청으로 인한 수정
</commit_message>
<xml_diff>
--- a/03 설계/Class 설계서_3조_THREEGO.pptx
+++ b/03 설계/Class 설계서_3조_THREEGO.pptx
@@ -1082,6 +1082,13 @@
   <p:clrMapOvr>
     <a:masterClrMapping/>
   </p:clrMapOvr>
+  <p:timing>
+    <p:tnLst>
+      <p:par>
+        <p:cTn id="1" dur="indefinite" restart="never" nodeType="tmRoot"/>
+      </p:par>
+    </p:tnLst>
+  </p:timing>
 </p:sldLayout>
 </file>
 
@@ -1111,7 +1118,7 @@
           <p:nvPr userDrawn="1">
             <p:extLst>
               <p:ext uri="{D42A27DB-BD31-4B8C-83A1-F6EECF244321}">
-                <p14:modId xmlns:p14="http://schemas.microsoft.com/office/powerpoint/2010/main" val="4241933172"/>
+                <p14:modId xmlns:p14="http://schemas.microsoft.com/office/powerpoint/2010/main" val="259738503"/>
               </p:ext>
             </p:extLst>
           </p:nvPr>
@@ -1861,7 +1868,7 @@
                           <a:latin typeface="맑은 고딕" pitchFamily="50" charset="-127"/>
                           <a:ea typeface="맑은 고딕" pitchFamily="50" charset="-127"/>
                         </a:rPr>
-                        <a:t>V 1.0.0</a:t>
+                        <a:t>V 1.0.1</a:t>
                       </a:r>
                       <a:endParaRPr kumimoji="1" lang="ko-KR" altLang="ko-KR" sz="900" b="0" i="0" u="none" strike="noStrike" cap="none" normalizeH="0" baseline="0" dirty="0" smtClean="0">
                         <a:ln>
@@ -2055,6 +2062,13 @@
   <p:clrMapOvr>
     <a:masterClrMapping/>
   </p:clrMapOvr>
+  <p:timing>
+    <p:tnLst>
+      <p:par>
+        <p:cTn id="1" dur="indefinite" restart="never" nodeType="tmRoot"/>
+      </p:par>
+    </p:tnLst>
+  </p:timing>
 </p:sldLayout>
 </file>
 
@@ -2155,35 +2169,35 @@
           <a:p>
             <a:pPr lvl="0"/>
             <a:r>
-              <a:rPr lang="ko-KR" altLang="en-US" smtClean="0"/>
+              <a:rPr lang="ko-KR" altLang="en-US" dirty="0" smtClean="0"/>
               <a:t>마스터 텍스트 스타일을 편집합니다</a:t>
             </a:r>
           </a:p>
           <a:p>
             <a:pPr lvl="1"/>
             <a:r>
-              <a:rPr lang="ko-KR" altLang="en-US" smtClean="0"/>
+              <a:rPr lang="ko-KR" altLang="en-US" dirty="0" smtClean="0"/>
               <a:t>둘째 수준</a:t>
             </a:r>
           </a:p>
           <a:p>
             <a:pPr lvl="2"/>
             <a:r>
-              <a:rPr lang="ko-KR" altLang="en-US" smtClean="0"/>
+              <a:rPr lang="ko-KR" altLang="en-US" dirty="0" smtClean="0"/>
               <a:t>셋째 수준</a:t>
             </a:r>
           </a:p>
           <a:p>
             <a:pPr lvl="3"/>
             <a:r>
-              <a:rPr lang="ko-KR" altLang="en-US" smtClean="0"/>
+              <a:rPr lang="ko-KR" altLang="en-US" dirty="0" smtClean="0"/>
               <a:t>넷째 수준</a:t>
             </a:r>
           </a:p>
           <a:p>
             <a:pPr lvl="4"/>
             <a:r>
-              <a:rPr lang="ko-KR" altLang="en-US" smtClean="0"/>
+              <a:rPr lang="ko-KR" altLang="en-US" dirty="0" smtClean="0"/>
               <a:t>다섯째 수준</a:t>
             </a:r>
             <a:endParaRPr lang="ko-KR" altLang="en-US" dirty="0"/>
@@ -2319,6 +2333,13 @@
   <p:clrMapOvr>
     <a:masterClrMapping/>
   </p:clrMapOvr>
+  <p:timing>
+    <p:tnLst>
+      <p:par>
+        <p:cTn id="1" dur="indefinite" restart="never" nodeType="tmRoot"/>
+      </p:par>
+    </p:tnLst>
+  </p:timing>
 </p:sldLayout>
 </file>
 
@@ -2527,6 +2548,13 @@
     <p:sldLayoutId id="2147483657" r:id="rId2"/>
     <p:sldLayoutId id="2147483662" r:id="rId3"/>
   </p:sldLayoutIdLst>
+  <p:timing>
+    <p:tnLst>
+      <p:par>
+        <p:cTn id="1" dur="indefinite" restart="never" nodeType="tmRoot"/>
+      </p:par>
+    </p:tnLst>
+  </p:timing>
   <p:hf sldNum="0" hdr="0" dt="0"/>
   <p:txStyles>
     <p:titleStyle>
@@ -3112,6 +3140,13 @@
   <p:clrMapOvr>
     <a:masterClrMapping/>
   </p:clrMapOvr>
+  <p:timing>
+    <p:tnLst>
+      <p:par>
+        <p:cTn id="1" dur="indefinite" restart="never" nodeType="tmRoot"/>
+      </p:par>
+    </p:tnLst>
+  </p:timing>
 </p:sld>
 </file>
 
@@ -3189,7 +3224,7 @@
             <p:ph idx="1"/>
             <p:extLst>
               <p:ext uri="{D42A27DB-BD31-4B8C-83A1-F6EECF244321}">
-                <p14:modId xmlns:p14="http://schemas.microsoft.com/office/powerpoint/2010/main" val="3314930904"/>
+                <p14:modId xmlns:p14="http://schemas.microsoft.com/office/powerpoint/2010/main" val="1221011176"/>
               </p:ext>
             </p:extLst>
           </p:nvPr>
@@ -3519,6 +3554,16 @@
                     <a:lstStyle/>
                     <a:p>
                       <a:pPr algn="ctr" latinLnBrk="1"/>
+                      <a:r>
+                        <a:rPr lang="en-US" altLang="ko-KR" sz="1200" b="0" dirty="0" smtClean="0">
+                          <a:solidFill>
+                            <a:schemeClr val="tx1"/>
+                          </a:solidFill>
+                          <a:latin typeface="맑은 고딕" pitchFamily="50" charset="-127"/>
+                          <a:ea typeface="맑은 고딕" pitchFamily="50" charset="-127"/>
+                        </a:rPr>
+                        <a:t>2018-05-15</a:t>
+                      </a:r>
                       <a:endParaRPr lang="ko-KR" altLang="en-US" sz="1200" b="0" dirty="0">
                         <a:solidFill>
                           <a:schemeClr val="tx1"/>
@@ -3540,6 +3585,26 @@
                     <a:lstStyle/>
                     <a:p>
                       <a:pPr algn="ctr" latinLnBrk="1"/>
+                      <a:r>
+                        <a:rPr lang="en-US" altLang="ko-KR" sz="1200" b="0" dirty="0" smtClean="0">
+                          <a:solidFill>
+                            <a:schemeClr val="tx1"/>
+                          </a:solidFill>
+                          <a:latin typeface="맑은 고딕" pitchFamily="50" charset="-127"/>
+                          <a:ea typeface="맑은 고딕" pitchFamily="50" charset="-127"/>
+                        </a:rPr>
+                        <a:t>V</a:t>
+                      </a:r>
+                      <a:r>
+                        <a:rPr lang="en-US" altLang="ko-KR" sz="1200" b="0" baseline="0" dirty="0" smtClean="0">
+                          <a:solidFill>
+                            <a:schemeClr val="tx1"/>
+                          </a:solidFill>
+                          <a:latin typeface="맑은 고딕" pitchFamily="50" charset="-127"/>
+                          <a:ea typeface="맑은 고딕" pitchFamily="50" charset="-127"/>
+                        </a:rPr>
+                        <a:t> 1.0.1</a:t>
+                      </a:r>
                       <a:endParaRPr lang="ko-KR" altLang="en-US" sz="1200" b="0" dirty="0">
                         <a:solidFill>
                           <a:schemeClr val="tx1"/>
@@ -3561,7 +3626,37 @@
                     <a:lstStyle/>
                     <a:p>
                       <a:pPr latinLnBrk="1"/>
-                      <a:endParaRPr lang="ko-KR" altLang="en-US" sz="1200" b="0">
+                      <a:r>
+                        <a:rPr lang="en-US" altLang="ko-KR" sz="1200" b="0" dirty="0" smtClean="0">
+                          <a:solidFill>
+                            <a:schemeClr val="tx1"/>
+                          </a:solidFill>
+                          <a:latin typeface="맑은 고딕" pitchFamily="50" charset="-127"/>
+                          <a:ea typeface="맑은 고딕" pitchFamily="50" charset="-127"/>
+                        </a:rPr>
+                        <a:t>T</a:t>
+                      </a:r>
+                      <a:r>
+                        <a:rPr lang="en-US" altLang="ko-KR" sz="1200" b="0" baseline="0" dirty="0" smtClean="0">
+                          <a:solidFill>
+                            <a:schemeClr val="tx1"/>
+                          </a:solidFill>
+                          <a:latin typeface="맑은 고딕" pitchFamily="50" charset="-127"/>
+                          <a:ea typeface="맑은 고딕" pitchFamily="50" charset="-127"/>
+                        </a:rPr>
+                        <a:t>o do List </a:t>
+                      </a:r>
+                      <a:r>
+                        <a:rPr lang="ko-KR" altLang="en-US" sz="1200" b="0" baseline="0" dirty="0" smtClean="0">
+                          <a:solidFill>
+                            <a:schemeClr val="tx1"/>
+                          </a:solidFill>
+                          <a:latin typeface="맑은 고딕" pitchFamily="50" charset="-127"/>
+                          <a:ea typeface="맑은 고딕" pitchFamily="50" charset="-127"/>
+                        </a:rPr>
+                        <a:t>패널 수정</a:t>
+                      </a:r>
+                      <a:endParaRPr lang="ko-KR" altLang="en-US" sz="1200" b="0" dirty="0">
                         <a:solidFill>
                           <a:schemeClr val="tx1"/>
                         </a:solidFill>
@@ -3582,6 +3677,16 @@
                     <a:lstStyle/>
                     <a:p>
                       <a:pPr algn="ctr" latinLnBrk="1"/>
+                      <a:r>
+                        <a:rPr lang="ko-KR" altLang="en-US" sz="1200" b="0" dirty="0" smtClean="0">
+                          <a:solidFill>
+                            <a:schemeClr val="tx1"/>
+                          </a:solidFill>
+                          <a:latin typeface="맑은 고딕" pitchFamily="50" charset="-127"/>
+                          <a:ea typeface="맑은 고딕" pitchFamily="50" charset="-127"/>
+                        </a:rPr>
+                        <a:t>김 정 현</a:t>
+                      </a:r>
                       <a:endParaRPr lang="ko-KR" altLang="en-US" sz="1200" b="0" dirty="0">
                         <a:solidFill>
                           <a:schemeClr val="tx1"/>
@@ -4067,6 +4172,13 @@
   <p:clrMapOvr>
     <a:masterClrMapping/>
   </p:clrMapOvr>
+  <p:timing>
+    <p:tnLst>
+      <p:par>
+        <p:cTn id="1" dur="indefinite" restart="never" nodeType="tmRoot"/>
+      </p:par>
+    </p:tnLst>
+  </p:timing>
 </p:sld>
 </file>
 
@@ -5618,14 +5730,14 @@
           <p:nvPr>
             <p:extLst>
               <p:ext uri="{D42A27DB-BD31-4B8C-83A1-F6EECF244321}">
-                <p14:modId xmlns:p14="http://schemas.microsoft.com/office/powerpoint/2010/main" val="1690044487"/>
+                <p14:modId xmlns:p14="http://schemas.microsoft.com/office/powerpoint/2010/main" val="1596453611"/>
               </p:ext>
             </p:extLst>
           </p:nvPr>
         </p:nvGraphicFramePr>
         <p:xfrm>
           <a:off x="5320457" y="1988130"/>
-          <a:ext cx="1685776" cy="2758440"/>
+          <a:ext cx="1685776" cy="3169920"/>
         </p:xfrm>
         <a:graphic>
           <a:graphicData uri="http://schemas.openxmlformats.org/drawingml/2006/table">
@@ -5873,7 +5985,7 @@
                         <a:t>중요도 </a:t>
                       </a:r>
                       <a:r>
-                        <a:rPr lang="en-US" altLang="ko-KR" sz="900" dirty="0">
+                        <a:rPr lang="en-US" altLang="ko-KR" sz="900" dirty="0" smtClean="0">
                           <a:solidFill>
                             <a:schemeClr val="tx1"/>
                           </a:solidFill>
@@ -5882,6 +5994,56 @@
                         </a:rPr>
                         <a:t>Button</a:t>
                       </a:r>
+                    </a:p>
+                    <a:p>
+                      <a:pPr latinLnBrk="1"/>
+                      <a:r>
+                        <a:rPr lang="ko-KR" altLang="en-US" sz="900" dirty="0" smtClean="0">
+                          <a:solidFill>
+                            <a:schemeClr val="tx1"/>
+                          </a:solidFill>
+                          <a:latin typeface="맑은 고딕" pitchFamily="50" charset="-127"/>
+                          <a:ea typeface="맑은 고딕" pitchFamily="50" charset="-127"/>
+                        </a:rPr>
+                        <a:t>보이기</a:t>
+                      </a:r>
+                      <a:r>
+                        <a:rPr lang="en-US" altLang="ko-KR" sz="900" dirty="0" smtClean="0">
+                          <a:solidFill>
+                            <a:schemeClr val="tx1"/>
+                          </a:solidFill>
+                          <a:latin typeface="맑은 고딕" pitchFamily="50" charset="-127"/>
+                          <a:ea typeface="맑은 고딕" pitchFamily="50" charset="-127"/>
+                        </a:rPr>
+                        <a:t>/</a:t>
+                      </a:r>
+                      <a:r>
+                        <a:rPr lang="ko-KR" altLang="en-US" sz="900" dirty="0" smtClean="0">
+                          <a:solidFill>
+                            <a:schemeClr val="tx1"/>
+                          </a:solidFill>
+                          <a:latin typeface="맑은 고딕" pitchFamily="50" charset="-127"/>
+                          <a:ea typeface="맑은 고딕" pitchFamily="50" charset="-127"/>
+                        </a:rPr>
+                        <a:t>숨기기 </a:t>
+                      </a:r>
+                      <a:r>
+                        <a:rPr lang="en-US" altLang="ko-KR" sz="900" dirty="0" smtClean="0">
+                          <a:solidFill>
+                            <a:schemeClr val="tx1"/>
+                          </a:solidFill>
+                          <a:latin typeface="맑은 고딕" pitchFamily="50" charset="-127"/>
+                          <a:ea typeface="맑은 고딕" pitchFamily="50" charset="-127"/>
+                        </a:rPr>
+                        <a:t>Button</a:t>
+                      </a:r>
+                      <a:endParaRPr lang="en-US" altLang="ko-KR" sz="900" dirty="0">
+                        <a:solidFill>
+                          <a:schemeClr val="tx1"/>
+                        </a:solidFill>
+                        <a:latin typeface="맑은 고딕" pitchFamily="50" charset="-127"/>
+                        <a:ea typeface="맑은 고딕" pitchFamily="50" charset="-127"/>
+                      </a:endParaRPr>
                     </a:p>
                   </a:txBody>
                   <a:tcPr marL="68580" marR="68580">
@@ -6195,7 +6357,7 @@
                         <a:t>상태 정렬</a:t>
                       </a:r>
                       <a:r>
-                        <a:rPr lang="en-US" altLang="ko-KR" sz="900" b="0" dirty="0">
+                        <a:rPr lang="en-US" altLang="ko-KR" sz="900" b="0" dirty="0" smtClean="0">
                           <a:solidFill>
                             <a:schemeClr val="tx1"/>
                           </a:solidFill>
@@ -6204,6 +6366,109 @@
                         </a:rPr>
                         <a:t>()</a:t>
                       </a:r>
+                    </a:p>
+                    <a:p>
+                      <a:pPr latinLnBrk="1"/>
+                      <a:r>
+                        <a:rPr lang="ko-KR" altLang="en-US" sz="900" b="0" dirty="0" smtClean="0">
+                          <a:solidFill>
+                            <a:schemeClr val="tx1"/>
+                          </a:solidFill>
+                          <a:latin typeface="맑은 고딕" pitchFamily="50" charset="-127"/>
+                          <a:ea typeface="맑은 고딕" pitchFamily="50" charset="-127"/>
+                        </a:rPr>
+                        <a:t>완료 </a:t>
+                      </a:r>
+                      <a:r>
+                        <a:rPr lang="en-US" altLang="ko-KR" sz="900" b="0" dirty="0" smtClean="0">
+                          <a:solidFill>
+                            <a:schemeClr val="tx1"/>
+                          </a:solidFill>
+                          <a:latin typeface="맑은 고딕" pitchFamily="50" charset="-127"/>
+                          <a:ea typeface="맑은 고딕" pitchFamily="50" charset="-127"/>
+                        </a:rPr>
+                        <a:t>To do </a:t>
+                      </a:r>
+                      <a:r>
+                        <a:rPr lang="ko-KR" altLang="en-US" sz="900" b="0" dirty="0" smtClean="0">
+                          <a:solidFill>
+                            <a:schemeClr val="tx1"/>
+                          </a:solidFill>
+                          <a:latin typeface="맑은 고딕" pitchFamily="50" charset="-127"/>
+                          <a:ea typeface="맑은 고딕" pitchFamily="50" charset="-127"/>
+                        </a:rPr>
+                        <a:t>항목 보이기</a:t>
+                      </a:r>
+                      <a:r>
+                        <a:rPr lang="en-US" altLang="ko-KR" sz="900" b="0" dirty="0" smtClean="0">
+                          <a:solidFill>
+                            <a:schemeClr val="tx1"/>
+                          </a:solidFill>
+                          <a:latin typeface="맑은 고딕" pitchFamily="50" charset="-127"/>
+                          <a:ea typeface="맑은 고딕" pitchFamily="50" charset="-127"/>
+                        </a:rPr>
+                        <a:t>()</a:t>
+                      </a:r>
+                    </a:p>
+                    <a:p>
+                      <a:pPr latinLnBrk="1"/>
+                      <a:r>
+                        <a:rPr lang="ko-KR" altLang="en-US" sz="900" b="0" dirty="0" smtClean="0">
+                          <a:solidFill>
+                            <a:schemeClr val="tx1"/>
+                          </a:solidFill>
+                          <a:latin typeface="맑은 고딕" pitchFamily="50" charset="-127"/>
+                          <a:ea typeface="맑은 고딕" pitchFamily="50" charset="-127"/>
+                        </a:rPr>
+                        <a:t>완료 </a:t>
+                      </a:r>
+                      <a:r>
+                        <a:rPr lang="en-US" altLang="ko-KR" sz="900" b="0" dirty="0" smtClean="0">
+                          <a:solidFill>
+                            <a:schemeClr val="tx1"/>
+                          </a:solidFill>
+                          <a:latin typeface="맑은 고딕" pitchFamily="50" charset="-127"/>
+                          <a:ea typeface="맑은 고딕" pitchFamily="50" charset="-127"/>
+                        </a:rPr>
+                        <a:t>To</a:t>
+                      </a:r>
+                      <a:r>
+                        <a:rPr lang="en-US" altLang="ko-KR" sz="900" b="0" baseline="0" dirty="0" smtClean="0">
+                          <a:solidFill>
+                            <a:schemeClr val="tx1"/>
+                          </a:solidFill>
+                          <a:latin typeface="맑은 고딕" pitchFamily="50" charset="-127"/>
+                          <a:ea typeface="맑은 고딕" pitchFamily="50" charset="-127"/>
+                        </a:rPr>
+                        <a:t> do </a:t>
+                      </a:r>
+                      <a:r>
+                        <a:rPr lang="ko-KR" altLang="en-US" sz="900" b="0" baseline="0" dirty="0" smtClean="0">
+                          <a:solidFill>
+                            <a:schemeClr val="tx1"/>
+                          </a:solidFill>
+                          <a:latin typeface="맑은 고딕" pitchFamily="50" charset="-127"/>
+                          <a:ea typeface="맑은 고딕" pitchFamily="50" charset="-127"/>
+                        </a:rPr>
+                        <a:t>항목 숨기기</a:t>
+                      </a:r>
+                      <a:r>
+                        <a:rPr lang="en-US" altLang="ko-KR" sz="900" b="0" baseline="0" dirty="0" smtClean="0">
+                          <a:solidFill>
+                            <a:schemeClr val="tx1"/>
+                          </a:solidFill>
+                          <a:latin typeface="맑은 고딕" pitchFamily="50" charset="-127"/>
+                          <a:ea typeface="맑은 고딕" pitchFamily="50" charset="-127"/>
+                        </a:rPr>
+                        <a:t>()</a:t>
+                      </a:r>
+                      <a:endParaRPr lang="en-US" altLang="ko-KR" sz="900" b="0" dirty="0" smtClean="0">
+                        <a:solidFill>
+                          <a:schemeClr val="tx1"/>
+                        </a:solidFill>
+                        <a:latin typeface="맑은 고딕" pitchFamily="50" charset="-127"/>
+                        <a:ea typeface="맑은 고딕" pitchFamily="50" charset="-127"/>
+                      </a:endParaRPr>
                     </a:p>
                   </a:txBody>
                   <a:tcPr marL="68580" marR="68580">
@@ -7885,13 +8150,13 @@
           <p:nvPr>
             <p:extLst>
               <p:ext uri="{D42A27DB-BD31-4B8C-83A1-F6EECF244321}">
-                <p14:modId xmlns:p14="http://schemas.microsoft.com/office/powerpoint/2010/main" val="2847195041"/>
+                <p14:modId xmlns:p14="http://schemas.microsoft.com/office/powerpoint/2010/main" val="2765136128"/>
               </p:ext>
             </p:extLst>
           </p:nvPr>
         </p:nvGraphicFramePr>
         <p:xfrm>
-          <a:off x="5320457" y="5204882"/>
+          <a:off x="4290083" y="5298741"/>
           <a:ext cx="1030374" cy="975360"/>
         </p:xfrm>
         <a:graphic>
@@ -8373,8 +8638,8 @@
         </p:nvCxnSpPr>
         <p:spPr bwMode="auto">
           <a:xfrm>
-            <a:off x="7006233" y="3367350"/>
-            <a:ext cx="1031961" cy="407391"/>
+            <a:off x="7006233" y="3573090"/>
+            <a:ext cx="1031961" cy="201651"/>
           </a:xfrm>
           <a:prstGeom prst="straightConnector1">
             <a:avLst/>
@@ -8398,15 +8663,14 @@
         <p:nvCxnSpPr>
           <p:cNvPr id="51" name="직선 화살표 연결선 50"/>
           <p:cNvCxnSpPr>
-            <a:stCxn id="9" idx="2"/>
             <a:endCxn id="21" idx="0"/>
           </p:cNvCxnSpPr>
           <p:nvPr/>
         </p:nvCxnSpPr>
         <p:spPr bwMode="auto">
           <a:xfrm flipH="1">
-            <a:off x="5835644" y="4746570"/>
-            <a:ext cx="327701" cy="458312"/>
+            <a:off x="4805270" y="4816366"/>
+            <a:ext cx="515187" cy="482375"/>
           </a:xfrm>
           <a:prstGeom prst="straightConnector1">
             <a:avLst/>
@@ -8460,6 +8724,13 @@
   <p:clrMapOvr>
     <a:masterClrMapping/>
   </p:clrMapOvr>
+  <p:timing>
+    <p:tnLst>
+      <p:par>
+        <p:cTn id="1" dur="indefinite" restart="never" nodeType="tmRoot"/>
+      </p:par>
+    </p:tnLst>
+  </p:timing>
 </p:sld>
 </file>
 

</xml_diff>